<commit_message>
added fig1 in manuscript
</commit_message>
<xml_diff>
--- a/outputs/04_figure1_arranged.pptx
+++ b/outputs/04_figure1_arranged.pptx
@@ -7,6 +7,7 @@
   <p:sldIdLst>
     <p:sldId id="257" r:id="rId2"/>
     <p:sldId id="258" r:id="rId3"/>
+    <p:sldId id="259" r:id="rId4"/>
   </p:sldIdLst>
   <p:sldSz cx="12192000" cy="6858000"/>
   <p:notesSz cx="6858000" cy="9144000"/>
@@ -3335,6 +3336,60 @@
 </p:sld>
 </file>
 
+<file path=ppt/slides/slide3.xml><?xml version="1.0" encoding="utf-8"?>
+<p:sld xmlns:a="http://schemas.openxmlformats.org/drawingml/2006/main" xmlns:r="http://schemas.openxmlformats.org/officeDocument/2006/relationships" xmlns:p="http://schemas.openxmlformats.org/presentationml/2006/main">
+  <p:cSld>
+    <p:spTree>
+      <p:nvGrpSpPr>
+        <p:cNvPr id="1" name=""/>
+        <p:cNvGrpSpPr/>
+        <p:nvPr/>
+      </p:nvGrpSpPr>
+      <p:grpSpPr>
+        <a:xfrm>
+          <a:off x="0" y="0"/>
+          <a:ext cx="0" cy="0"/>
+          <a:chOff x="0" y="0"/>
+          <a:chExt cx="0" cy="0"/>
+        </a:xfrm>
+      </p:grpSpPr>
+      <p:pic>
+        <p:nvPicPr>
+          <p:cNvPr id="7" name="Picture 6"/>
+          <p:cNvPicPr>
+            <a:picLocks noChangeAspect="1"/>
+          </p:cNvPicPr>
+          <p:nvPr/>
+        </p:nvPicPr>
+        <p:blipFill>
+          <a:blip r:embed="rId2"/>
+          <a:stretch>
+            <a:fillRect/>
+          </a:stretch>
+        </p:blipFill>
+        <p:spPr>
+          <a:xfrm>
+            <a:off x="313443" y="819686"/>
+            <a:ext cx="11565114" cy="5218628"/>
+          </a:xfrm>
+          <a:prstGeom prst="rect">
+            <a:avLst/>
+          </a:prstGeom>
+        </p:spPr>
+      </p:pic>
+    </p:spTree>
+    <p:extLst>
+      <p:ext uri="{BB962C8B-B14F-4D97-AF65-F5344CB8AC3E}">
+        <p14:creationId xmlns:p14="http://schemas.microsoft.com/office/powerpoint/2010/main" val="1376484734"/>
+      </p:ext>
+    </p:extLst>
+  </p:cSld>
+  <p:clrMapOvr>
+    <a:masterClrMapping/>
+  </p:clrMapOvr>
+</p:sld>
+</file>
+
 <file path=ppt/theme/theme1.xml><?xml version="1.0" encoding="utf-8"?>
 <a:theme xmlns:a="http://schemas.openxmlformats.org/drawingml/2006/main" name="Office Theme">
   <a:themeElements>

</xml_diff>

<commit_message>
completed the methods section
</commit_message>
<xml_diff>
--- a/outputs/04_figure1_arranged.pptx
+++ b/outputs/04_figure1_arranged.pptx
@@ -256,7 +256,7 @@
           <a:p>
             <a:fld id="{C4979A4E-1FEC-41FD-BB1B-9E79827878E8}" type="datetimeFigureOut">
               <a:rPr lang="fr-CA" smtClean="0"/>
-              <a:t>2021-04-28</a:t>
+              <a:t>2021-04-29</a:t>
             </a:fld>
             <a:endParaRPr lang="fr-CA"/>
           </a:p>
@@ -426,7 +426,7 @@
           <a:p>
             <a:fld id="{C4979A4E-1FEC-41FD-BB1B-9E79827878E8}" type="datetimeFigureOut">
               <a:rPr lang="fr-CA" smtClean="0"/>
-              <a:t>2021-04-28</a:t>
+              <a:t>2021-04-29</a:t>
             </a:fld>
             <a:endParaRPr lang="fr-CA"/>
           </a:p>
@@ -606,7 +606,7 @@
           <a:p>
             <a:fld id="{C4979A4E-1FEC-41FD-BB1B-9E79827878E8}" type="datetimeFigureOut">
               <a:rPr lang="fr-CA" smtClean="0"/>
-              <a:t>2021-04-28</a:t>
+              <a:t>2021-04-29</a:t>
             </a:fld>
             <a:endParaRPr lang="fr-CA"/>
           </a:p>
@@ -776,7 +776,7 @@
           <a:p>
             <a:fld id="{C4979A4E-1FEC-41FD-BB1B-9E79827878E8}" type="datetimeFigureOut">
               <a:rPr lang="fr-CA" smtClean="0"/>
-              <a:t>2021-04-28</a:t>
+              <a:t>2021-04-29</a:t>
             </a:fld>
             <a:endParaRPr lang="fr-CA"/>
           </a:p>
@@ -1022,7 +1022,7 @@
           <a:p>
             <a:fld id="{C4979A4E-1FEC-41FD-BB1B-9E79827878E8}" type="datetimeFigureOut">
               <a:rPr lang="fr-CA" smtClean="0"/>
-              <a:t>2021-04-28</a:t>
+              <a:t>2021-04-29</a:t>
             </a:fld>
             <a:endParaRPr lang="fr-CA"/>
           </a:p>
@@ -1254,7 +1254,7 @@
           <a:p>
             <a:fld id="{C4979A4E-1FEC-41FD-BB1B-9E79827878E8}" type="datetimeFigureOut">
               <a:rPr lang="fr-CA" smtClean="0"/>
-              <a:t>2021-04-28</a:t>
+              <a:t>2021-04-29</a:t>
             </a:fld>
             <a:endParaRPr lang="fr-CA"/>
           </a:p>
@@ -1621,7 +1621,7 @@
           <a:p>
             <a:fld id="{C4979A4E-1FEC-41FD-BB1B-9E79827878E8}" type="datetimeFigureOut">
               <a:rPr lang="fr-CA" smtClean="0"/>
-              <a:t>2021-04-28</a:t>
+              <a:t>2021-04-29</a:t>
             </a:fld>
             <a:endParaRPr lang="fr-CA"/>
           </a:p>
@@ -1739,7 +1739,7 @@
           <a:p>
             <a:fld id="{C4979A4E-1FEC-41FD-BB1B-9E79827878E8}" type="datetimeFigureOut">
               <a:rPr lang="fr-CA" smtClean="0"/>
-              <a:t>2021-04-28</a:t>
+              <a:t>2021-04-29</a:t>
             </a:fld>
             <a:endParaRPr lang="fr-CA"/>
           </a:p>
@@ -1834,7 +1834,7 @@
           <a:p>
             <a:fld id="{C4979A4E-1FEC-41FD-BB1B-9E79827878E8}" type="datetimeFigureOut">
               <a:rPr lang="fr-CA" smtClean="0"/>
-              <a:t>2021-04-28</a:t>
+              <a:t>2021-04-29</a:t>
             </a:fld>
             <a:endParaRPr lang="fr-CA"/>
           </a:p>
@@ -2111,7 +2111,7 @@
           <a:p>
             <a:fld id="{C4979A4E-1FEC-41FD-BB1B-9E79827878E8}" type="datetimeFigureOut">
               <a:rPr lang="fr-CA" smtClean="0"/>
-              <a:t>2021-04-28</a:t>
+              <a:t>2021-04-29</a:t>
             </a:fld>
             <a:endParaRPr lang="fr-CA"/>
           </a:p>
@@ -2364,7 +2364,7 @@
           <a:p>
             <a:fld id="{C4979A4E-1FEC-41FD-BB1B-9E79827878E8}" type="datetimeFigureOut">
               <a:rPr lang="fr-CA" smtClean="0"/>
-              <a:t>2021-04-28</a:t>
+              <a:t>2021-04-29</a:t>
             </a:fld>
             <a:endParaRPr lang="fr-CA"/>
           </a:p>
@@ -2577,7 +2577,7 @@
           <a:p>
             <a:fld id="{C4979A4E-1FEC-41FD-BB1B-9E79827878E8}" type="datetimeFigureOut">
               <a:rPr lang="fr-CA" smtClean="0"/>
-              <a:t>2021-04-28</a:t>
+              <a:t>2021-04-29</a:t>
             </a:fld>
             <a:endParaRPr lang="fr-CA"/>
           </a:p>
@@ -3355,22 +3355,21 @@
       </p:grpSpPr>
       <p:pic>
         <p:nvPicPr>
-          <p:cNvPr id="7" name="Picture 6"/>
+          <p:cNvPr id="14" name="Picture 13"/>
           <p:cNvPicPr>
             <a:picLocks noChangeAspect="1"/>
           </p:cNvPicPr>
           <p:nvPr/>
         </p:nvPicPr>
-        <p:blipFill>
+        <p:blipFill rotWithShape="1">
           <a:blip r:embed="rId2"/>
-          <a:stretch>
-            <a:fillRect/>
-          </a:stretch>
+          <a:srcRect b="460"/>
+          <a:stretch/>
         </p:blipFill>
         <p:spPr>
           <a:xfrm>
-            <a:off x="313443" y="819686"/>
-            <a:ext cx="11565114" cy="5218628"/>
+            <a:off x="261622" y="816637"/>
+            <a:ext cx="11668755" cy="5200705"/>
           </a:xfrm>
           <a:prstGeom prst="rect">
             <a:avLst/>

</xml_diff>